<commit_message>
observaciones 1, 2, 3, 4, 8, 16, 18, 21 movimientos 2, 3, 4, 5, 6, 7, 8, 9, 10, 13, 14
</commit_message>
<xml_diff>
--- a/test.pptx
+++ b/test.pptx
@@ -6610,7 +6610,7 @@
           <a:p>
             <a:pPr algn="ctr"/>
             <a:r>
-              <a:t>24,340</a:t>
+              <a:t>24,341</a:t>
             </a:r>
             <a:endParaRPr lang="es-MX" sz="1400" dirty="0">
               <a:solidFill>
@@ -6645,7 +6645,7 @@
           <a:p>
             <a:pPr algn="ctr"/>
             <a:r>
-              <a:t>$ 5,348,189.05</a:t>
+              <a:t>$ 5,348,224.05</a:t>
             </a:r>
             <a:endParaRPr lang="es-MX" sz="1400" dirty="0">
               <a:latin typeface="Arial Narrow" panose="020B0606020202030204" pitchFamily="34" charset="0"/>
@@ -6741,7 +6741,7 @@
           <a:p>
             <a:pPr algn="ctr"/>
             <a:r>
-              <a:t>2,332</a:t>
+              <a:t>2,333</a:t>
             </a:r>
             <a:endParaRPr lang="es-MX" sz="1400" dirty="0">
               <a:latin typeface="Arial Narrow" panose="020B0606020202030204" pitchFamily="34" charset="0"/>
@@ -6773,7 +6773,7 @@
           <a:p>
             <a:pPr algn="ctr"/>
             <a:r>
-              <a:t>$ 2,492,868.77</a:t>
+              <a:t>$ 2,492,903.77</a:t>
             </a:r>
             <a:endParaRPr lang="es-MX" sz="1400" dirty="0">
               <a:latin typeface="Arial Narrow" panose="020B0606020202030204" pitchFamily="34" charset="0"/>

</xml_diff>